<commit_message>
MQ Mobile, footer prend tout, j'ai enleve display flex qui ne servait pas, pareil pour les marges, mais tjs pbl de l'espcae blanc à droite. (desktop, aside à 30%)
</commit_message>
<xml_diff>
--- a/AminaZahid_2_27042021/P2_03_support.pptx
+++ b/AminaZahid_2_27042021/P2_03_support.pptx
@@ -2994,7 +2994,7 @@
 <dgm:dataModel xmlns:dgm="http://schemas.openxmlformats.org/drawingml/2006/diagram" xmlns:a="http://schemas.openxmlformats.org/drawingml/2006/main">
   <dgm:ptLst>
     <dgm:pt modelId="{46F8EC24-6670-4EF8-8F75-3684AB7255C9}" type="doc">
-      <dgm:prSet loTypeId="urn:microsoft.com/office/officeart/2005/8/layout/list1" loCatId="list" qsTypeId="urn:microsoft.com/office/officeart/2005/8/quickstyle/simple1" qsCatId="simple" csTypeId="urn:microsoft.com/office/officeart/2005/8/colors/colorful5" csCatId="colorful"/>
+      <dgm:prSet loTypeId="urn:microsoft.com/office/officeart/2005/8/layout/list1" loCatId="list" qsTypeId="urn:microsoft.com/office/officeart/2005/8/quickstyle/simple1" qsCatId="simple" csTypeId="urn:microsoft.com/office/officeart/2005/8/colors/colorful5" csCatId="colorful" phldr="1"/>
       <dgm:spPr/>
       <dgm:t>
         <a:bodyPr/>
@@ -3123,10 +3123,58 @@
         <a:lstStyle/>
         <a:p>
           <a:r>
-            <a:rPr lang="fr-FR"/>
-            <a:t>Format Tablette : @media only screen and (min-device-width : 768px) and (max-device-width : 1024px). </a:t>
+            <a:rPr lang="fr-FR" dirty="0"/>
+            <a:t>Format Tablette vertical : @media </a:t>
           </a:r>
-          <a:endParaRPr lang="en-US"/>
+          <a:r>
+            <a:rPr lang="fr-FR" dirty="0" err="1"/>
+            <a:t>only</a:t>
+          </a:r>
+          <a:r>
+            <a:rPr lang="fr-FR" dirty="0"/>
+            <a:t> </a:t>
+          </a:r>
+          <a:r>
+            <a:rPr lang="fr-FR" dirty="0" err="1"/>
+            <a:t>screen</a:t>
+          </a:r>
+          <a:r>
+            <a:rPr lang="fr-FR" dirty="0"/>
+            <a:t> and (min-</a:t>
+          </a:r>
+          <a:r>
+            <a:rPr lang="fr-FR" dirty="0" err="1"/>
+            <a:t>device</a:t>
+          </a:r>
+          <a:r>
+            <a:rPr lang="fr-FR" dirty="0"/>
+            <a:t>-</a:t>
+          </a:r>
+          <a:r>
+            <a:rPr lang="fr-FR" dirty="0" err="1"/>
+            <a:t>width</a:t>
+          </a:r>
+          <a:r>
+            <a:rPr lang="fr-FR" dirty="0"/>
+            <a:t> : 768px) and (max-</a:t>
+          </a:r>
+          <a:r>
+            <a:rPr lang="fr-FR" dirty="0" err="1"/>
+            <a:t>device</a:t>
+          </a:r>
+          <a:r>
+            <a:rPr lang="fr-FR" dirty="0"/>
+            <a:t>-</a:t>
+          </a:r>
+          <a:r>
+            <a:rPr lang="fr-FR" dirty="0" err="1"/>
+            <a:t>width</a:t>
+          </a:r>
+          <a:r>
+            <a:rPr lang="fr-FR" dirty="0"/>
+            <a:t> : 1024px). </a:t>
+          </a:r>
+          <a:endParaRPr lang="en-US" dirty="0"/>
         </a:p>
       </dgm:t>
     </dgm:pt>
@@ -3151,6 +3199,36 @@
           <a:endParaRPr lang="en-US"/>
         </a:p>
       </dgm:t>
+    </dgm:pt>
+    <dgm:pt modelId="{541602FB-6BD3-BC4F-8BD8-6FD7C53B3446}">
+      <dgm:prSet/>
+      <dgm:spPr/>
+      <dgm:t>
+        <a:bodyPr/>
+        <a:lstStyle/>
+        <a:p>
+          <a:r>
+            <a:rPr lang="en-US" dirty="0"/>
+            <a:t>Format </a:t>
+          </a:r>
+          <a:r>
+            <a:rPr lang="en-US" dirty="0" err="1"/>
+            <a:t>Tablette</a:t>
+          </a:r>
+          <a:r>
+            <a:rPr lang="en-US" dirty="0"/>
+            <a:t> horizontal : </a:t>
+          </a:r>
+        </a:p>
+      </dgm:t>
+    </dgm:pt>
+    <dgm:pt modelId="{E5A427D3-A03A-7C45-AD1B-539A3BA173F5}" type="parTrans" cxnId="{B25F900C-E4C8-5A41-BA78-897F3373739B}">
+      <dgm:prSet/>
+      <dgm:spPr/>
+    </dgm:pt>
+    <dgm:pt modelId="{9CD3CDE6-8448-504E-ACC5-4871E2556144}" type="sibTrans" cxnId="{B25F900C-E4C8-5A41-BA78-897F3373739B}">
+      <dgm:prSet/>
+      <dgm:spPr/>
     </dgm:pt>
     <dgm:pt modelId="{7E27AEA5-3F6A-724B-BC80-3032374449EA}" type="pres">
       <dgm:prSet presAssocID="{46F8EC24-6670-4EF8-8F75-3684AB7255C9}" presName="linear" presStyleCnt="0">
@@ -3226,6 +3304,7 @@
     </dgm:pt>
   </dgm:ptLst>
   <dgm:cxnLst>
+    <dgm:cxn modelId="{B25F900C-E4C8-5A41-BA78-897F3373739B}" srcId="{7999E616-DE20-4815-9D50-0A56CCFC5959}" destId="{541602FB-6BD3-BC4F-8BD8-6FD7C53B3446}" srcOrd="2" destOrd="0" parTransId="{E5A427D3-A03A-7C45-AD1B-539A3BA173F5}" sibTransId="{9CD3CDE6-8448-504E-ACC5-4871E2556144}"/>
     <dgm:cxn modelId="{85E60D0F-BA6D-274E-8436-7EA8A9DEED7C}" type="presOf" srcId="{7999E616-DE20-4815-9D50-0A56CCFC5959}" destId="{72B7E57E-7E8C-234A-ADD0-31E0FDB68B53}" srcOrd="0" destOrd="0" presId="urn:microsoft.com/office/officeart/2005/8/layout/list1"/>
     <dgm:cxn modelId="{5896153C-93C6-44DD-A7C2-8024AE628E17}" srcId="{7999E616-DE20-4815-9D50-0A56CCFC5959}" destId="{968A72F2-9271-406A-834C-9DEEE48F0128}" srcOrd="0" destOrd="0" parTransId="{796FFA16-18A0-4A5A-BC98-08210F7AB629}" sibTransId="{D8221B2F-4468-4B84-92D2-8C914A4D7403}"/>
     <dgm:cxn modelId="{ACF98044-46CC-9344-8DB1-4166495F634B}" type="presOf" srcId="{926D5270-436D-4EE2-AC60-2BCA50AC36FD}" destId="{8AB532F2-EC9F-1E48-9F81-6224E18DBD6A}" srcOrd="0" destOrd="0" presId="urn:microsoft.com/office/officeart/2005/8/layout/list1"/>
@@ -3237,6 +3316,7 @@
     <dgm:cxn modelId="{C8E551E9-2846-2947-8FCE-9551E8702FB6}" type="presOf" srcId="{968A72F2-9271-406A-834C-9DEEE48F0128}" destId="{14089D8C-40B2-F943-BA57-8D2926F9FCCE}" srcOrd="0" destOrd="0" presId="urn:microsoft.com/office/officeart/2005/8/layout/list1"/>
     <dgm:cxn modelId="{4C4FA6EB-CD96-4E4D-B82F-9750204645BC}" type="presOf" srcId="{E2F0FFFC-E772-4308-9D5F-7EB75A9A8F19}" destId="{14089D8C-40B2-F943-BA57-8D2926F9FCCE}" srcOrd="0" destOrd="1" presId="urn:microsoft.com/office/officeart/2005/8/layout/list1"/>
     <dgm:cxn modelId="{626BDDF0-5A79-6844-9637-72CE477769DC}" type="presOf" srcId="{926D5270-436D-4EE2-AC60-2BCA50AC36FD}" destId="{39A1840A-37BA-2843-8C8C-34BF66852BCA}" srcOrd="1" destOrd="0" presId="urn:microsoft.com/office/officeart/2005/8/layout/list1"/>
+    <dgm:cxn modelId="{1578E7FB-5C4D-0A4E-9C33-42E636B3D7A8}" type="presOf" srcId="{541602FB-6BD3-BC4F-8BD8-6FD7C53B3446}" destId="{14089D8C-40B2-F943-BA57-8D2926F9FCCE}" srcOrd="0" destOrd="2" presId="urn:microsoft.com/office/officeart/2005/8/layout/list1"/>
     <dgm:cxn modelId="{C524A96E-6767-F74B-803C-41DD9A754588}" type="presParOf" srcId="{7E27AEA5-3F6A-724B-BC80-3032374449EA}" destId="{F52DE8A3-4E36-4E49-939A-10D98415E1C2}" srcOrd="0" destOrd="0" presId="urn:microsoft.com/office/officeart/2005/8/layout/list1"/>
     <dgm:cxn modelId="{771618F6-4A3C-174B-9F9E-B12135301F57}" type="presParOf" srcId="{F52DE8A3-4E36-4E49-939A-10D98415E1C2}" destId="{8AB532F2-EC9F-1E48-9F81-6224E18DBD6A}" srcOrd="0" destOrd="0" presId="urn:microsoft.com/office/officeart/2005/8/layout/list1"/>
     <dgm:cxn modelId="{AAC48592-F06D-7D4A-A7E9-3AC7F91E8171}" type="presParOf" srcId="{F52DE8A3-4E36-4E49-939A-10D98415E1C2}" destId="{39A1840A-37BA-2843-8C8C-34BF66852BCA}" srcOrd="1" destOrd="0" presId="urn:microsoft.com/office/officeart/2005/8/layout/list1"/>
@@ -3989,7 +4069,7 @@
       </dsp:nvSpPr>
       <dsp:spPr>
         <a:xfrm>
-          <a:off x="0" y="839393"/>
+          <a:off x="0" y="634643"/>
           <a:ext cx="6263640" cy="655200"/>
         </a:xfrm>
         <a:prstGeom prst="rect">
@@ -4038,7 +4118,7 @@
       </dsp:nvSpPr>
       <dsp:spPr>
         <a:xfrm>
-          <a:off x="313182" y="455633"/>
+          <a:off x="313182" y="250883"/>
           <a:ext cx="4384548" cy="767520"/>
         </a:xfrm>
         <a:prstGeom prst="roundRect">
@@ -4106,7 +4186,7 @@
         </a:p>
       </dsp:txBody>
       <dsp:txXfrm>
-        <a:off x="350649" y="493100"/>
+        <a:off x="350649" y="288350"/>
         <a:ext cx="4309614" cy="692586"/>
       </dsp:txXfrm>
     </dsp:sp>
@@ -4117,8 +4197,8 @@
       </dsp:nvSpPr>
       <dsp:spPr>
         <a:xfrm>
-          <a:off x="0" y="2018754"/>
-          <a:ext cx="6263640" cy="3030300"/>
+          <a:off x="0" y="1814003"/>
+          <a:ext cx="6263640" cy="3439800"/>
         </a:xfrm>
         <a:prstGeom prst="rect">
           <a:avLst/>
@@ -4196,15 +4276,89 @@
             <a:buChar char="•"/>
           </a:pPr>
           <a:r>
-            <a:rPr lang="fr-FR" sz="2600" kern="1200"/>
-            <a:t>Format Tablette : @media only screen and (min-device-width : 768px) and (max-device-width : 1024px). </a:t>
+            <a:rPr lang="fr-FR" sz="2600" kern="1200" dirty="0"/>
+            <a:t>Format Tablette vertical : @media </a:t>
           </a:r>
-          <a:endParaRPr lang="en-US" sz="2600" kern="1200"/>
+          <a:r>
+            <a:rPr lang="fr-FR" sz="2600" kern="1200" dirty="0" err="1"/>
+            <a:t>only</a:t>
+          </a:r>
+          <a:r>
+            <a:rPr lang="fr-FR" sz="2600" kern="1200" dirty="0"/>
+            <a:t> </a:t>
+          </a:r>
+          <a:r>
+            <a:rPr lang="fr-FR" sz="2600" kern="1200" dirty="0" err="1"/>
+            <a:t>screen</a:t>
+          </a:r>
+          <a:r>
+            <a:rPr lang="fr-FR" sz="2600" kern="1200" dirty="0"/>
+            <a:t> and (min-</a:t>
+          </a:r>
+          <a:r>
+            <a:rPr lang="fr-FR" sz="2600" kern="1200" dirty="0" err="1"/>
+            <a:t>device</a:t>
+          </a:r>
+          <a:r>
+            <a:rPr lang="fr-FR" sz="2600" kern="1200" dirty="0"/>
+            <a:t>-</a:t>
+          </a:r>
+          <a:r>
+            <a:rPr lang="fr-FR" sz="2600" kern="1200" dirty="0" err="1"/>
+            <a:t>width</a:t>
+          </a:r>
+          <a:r>
+            <a:rPr lang="fr-FR" sz="2600" kern="1200" dirty="0"/>
+            <a:t> : 768px) and (max-</a:t>
+          </a:r>
+          <a:r>
+            <a:rPr lang="fr-FR" sz="2600" kern="1200" dirty="0" err="1"/>
+            <a:t>device</a:t>
+          </a:r>
+          <a:r>
+            <a:rPr lang="fr-FR" sz="2600" kern="1200" dirty="0"/>
+            <a:t>-</a:t>
+          </a:r>
+          <a:r>
+            <a:rPr lang="fr-FR" sz="2600" kern="1200" dirty="0" err="1"/>
+            <a:t>width</a:t>
+          </a:r>
+          <a:r>
+            <a:rPr lang="fr-FR" sz="2600" kern="1200" dirty="0"/>
+            <a:t> : 1024px). </a:t>
+          </a:r>
+          <a:endParaRPr lang="en-US" sz="2600" kern="1200" dirty="0"/>
+        </a:p>
+        <a:p>
+          <a:pPr marL="228600" lvl="1" indent="-228600" algn="l" defTabSz="1155700">
+            <a:lnSpc>
+              <a:spcPct val="90000"/>
+            </a:lnSpc>
+            <a:spcBef>
+              <a:spcPct val="0"/>
+            </a:spcBef>
+            <a:spcAft>
+              <a:spcPct val="15000"/>
+            </a:spcAft>
+            <a:buChar char="•"/>
+          </a:pPr>
+          <a:r>
+            <a:rPr lang="en-US" sz="2600" kern="1200" dirty="0"/>
+            <a:t>Format </a:t>
+          </a:r>
+          <a:r>
+            <a:rPr lang="en-US" sz="2600" kern="1200" dirty="0" err="1"/>
+            <a:t>Tablette</a:t>
+          </a:r>
+          <a:r>
+            <a:rPr lang="en-US" sz="2600" kern="1200" dirty="0"/>
+            <a:t> horizontal : </a:t>
+          </a:r>
         </a:p>
       </dsp:txBody>
       <dsp:txXfrm>
-        <a:off x="0" y="2018754"/>
-        <a:ext cx="6263640" cy="3030300"/>
+        <a:off x="0" y="1814003"/>
+        <a:ext cx="6263640" cy="3439800"/>
       </dsp:txXfrm>
     </dsp:sp>
     <dsp:sp modelId="{CF79ABAC-2BCA-7A4B-B6FB-B7B589F72F54}">
@@ -4214,7 +4368,7 @@
       </dsp:nvSpPr>
       <dsp:spPr>
         <a:xfrm>
-          <a:off x="313182" y="1634994"/>
+          <a:off x="313182" y="1430243"/>
           <a:ext cx="4384548" cy="767520"/>
         </a:xfrm>
         <a:prstGeom prst="roundRect">
@@ -4282,7 +4436,7 @@
         </a:p>
       </dsp:txBody>
       <dsp:txXfrm>
-        <a:off x="350649" y="1672461"/>
+        <a:off x="350649" y="1467710"/>
         <a:ext cx="4309614" cy="692586"/>
       </dsp:txXfrm>
     </dsp:sp>
@@ -8335,7 +8489,7 @@
           <a:p>
             <a:fld id="{072B5D5D-7D9C-B247-A42B-B7FCCA224F89}" type="datetimeFigureOut">
               <a:rPr lang="fr-FR" smtClean="0"/>
-              <a:t>11/06/2021</a:t>
+              <a:t>21/06/2021</a:t>
             </a:fld>
             <a:endParaRPr lang="fr-FR"/>
           </a:p>
@@ -8901,7 +9055,7 @@
           <a:p>
             <a:fld id="{6E628939-5BA2-A04E-93A6-C3BED22BA497}" type="datetimeFigureOut">
               <a:rPr lang="fr-FR" smtClean="0"/>
-              <a:t>11/06/2021</a:t>
+              <a:t>21/06/2021</a:t>
             </a:fld>
             <a:endParaRPr lang="fr-FR"/>
           </a:p>
@@ -9071,7 +9225,7 @@
           <a:p>
             <a:fld id="{6E628939-5BA2-A04E-93A6-C3BED22BA497}" type="datetimeFigureOut">
               <a:rPr lang="fr-FR" smtClean="0"/>
-              <a:t>11/06/2021</a:t>
+              <a:t>21/06/2021</a:t>
             </a:fld>
             <a:endParaRPr lang="fr-FR"/>
           </a:p>
@@ -9251,7 +9405,7 @@
           <a:p>
             <a:fld id="{6E628939-5BA2-A04E-93A6-C3BED22BA497}" type="datetimeFigureOut">
               <a:rPr lang="fr-FR" smtClean="0"/>
-              <a:t>11/06/2021</a:t>
+              <a:t>21/06/2021</a:t>
             </a:fld>
             <a:endParaRPr lang="fr-FR"/>
           </a:p>
@@ -9421,7 +9575,7 @@
           <a:p>
             <a:fld id="{6E628939-5BA2-A04E-93A6-C3BED22BA497}" type="datetimeFigureOut">
               <a:rPr lang="fr-FR" smtClean="0"/>
-              <a:t>11/06/2021</a:t>
+              <a:t>21/06/2021</a:t>
             </a:fld>
             <a:endParaRPr lang="fr-FR"/>
           </a:p>
@@ -9667,7 +9821,7 @@
           <a:p>
             <a:fld id="{6E628939-5BA2-A04E-93A6-C3BED22BA497}" type="datetimeFigureOut">
               <a:rPr lang="fr-FR" smtClean="0"/>
-              <a:t>11/06/2021</a:t>
+              <a:t>21/06/2021</a:t>
             </a:fld>
             <a:endParaRPr lang="fr-FR"/>
           </a:p>
@@ -9899,7 +10053,7 @@
           <a:p>
             <a:fld id="{6E628939-5BA2-A04E-93A6-C3BED22BA497}" type="datetimeFigureOut">
               <a:rPr lang="fr-FR" smtClean="0"/>
-              <a:t>11/06/2021</a:t>
+              <a:t>21/06/2021</a:t>
             </a:fld>
             <a:endParaRPr lang="fr-FR"/>
           </a:p>
@@ -10266,7 +10420,7 @@
           <a:p>
             <a:fld id="{6E628939-5BA2-A04E-93A6-C3BED22BA497}" type="datetimeFigureOut">
               <a:rPr lang="fr-FR" smtClean="0"/>
-              <a:t>11/06/2021</a:t>
+              <a:t>21/06/2021</a:t>
             </a:fld>
             <a:endParaRPr lang="fr-FR"/>
           </a:p>
@@ -10384,7 +10538,7 @@
           <a:p>
             <a:fld id="{6E628939-5BA2-A04E-93A6-C3BED22BA497}" type="datetimeFigureOut">
               <a:rPr lang="fr-FR" smtClean="0"/>
-              <a:t>11/06/2021</a:t>
+              <a:t>21/06/2021</a:t>
             </a:fld>
             <a:endParaRPr lang="fr-FR"/>
           </a:p>
@@ -10479,7 +10633,7 @@
           <a:p>
             <a:fld id="{6E628939-5BA2-A04E-93A6-C3BED22BA497}" type="datetimeFigureOut">
               <a:rPr lang="fr-FR" smtClean="0"/>
-              <a:t>11/06/2021</a:t>
+              <a:t>21/06/2021</a:t>
             </a:fld>
             <a:endParaRPr lang="fr-FR"/>
           </a:p>
@@ -10756,7 +10910,7 @@
           <a:p>
             <a:fld id="{6E628939-5BA2-A04E-93A6-C3BED22BA497}" type="datetimeFigureOut">
               <a:rPr lang="fr-FR" smtClean="0"/>
-              <a:t>11/06/2021</a:t>
+              <a:t>21/06/2021</a:t>
             </a:fld>
             <a:endParaRPr lang="fr-FR"/>
           </a:p>
@@ -11013,7 +11167,7 @@
           <a:p>
             <a:fld id="{6E628939-5BA2-A04E-93A6-C3BED22BA497}" type="datetimeFigureOut">
               <a:rPr lang="fr-FR" smtClean="0"/>
-              <a:t>11/06/2021</a:t>
+              <a:t>21/06/2021</a:t>
             </a:fld>
             <a:endParaRPr lang="fr-FR"/>
           </a:p>
@@ -11226,7 +11380,7 @@
           <a:p>
             <a:fld id="{6E628939-5BA2-A04E-93A6-C3BED22BA497}" type="datetimeFigureOut">
               <a:rPr lang="fr-FR" smtClean="0"/>
-              <a:t>11/06/2021</a:t>
+              <a:t>21/06/2021</a:t>
             </a:fld>
             <a:endParaRPr lang="fr-FR"/>
           </a:p>
@@ -13218,7 +13372,7 @@
         <p:spPr>
           <a:xfrm>
             <a:off x="4709796" y="2003136"/>
-            <a:ext cx="5805804" cy="2308324"/>
+            <a:ext cx="5805804" cy="1569660"/>
           </a:xfrm>
           <a:prstGeom prst="rect">
             <a:avLst/>
@@ -13250,25 +13404,13 @@
             </a:pPr>
             <a:r>
               <a:rPr lang="fr-FR" sz="2400" dirty="0"/>
-              <a:t>Faire mes premiers pas dans le développement web </a:t>
+              <a:t>Faire mes premiers pas dans le développement </a:t>
             </a:r>
-          </a:p>
-          <a:p>
-            <a:pPr marL="285750" indent="-285750">
-              <a:buFont typeface="Arial" panose="020B0604020202020204" pitchFamily="34" charset="0"/>
-              <a:buChar char="•"/>
-            </a:pPr>
+            <a:r>
+              <a:rPr lang="fr-FR" sz="2400"/>
+              <a:t>web </a:t>
+            </a:r>
             <a:endParaRPr lang="fr-FR" sz="2400" dirty="0"/>
-          </a:p>
-          <a:p>
-            <a:pPr marL="285750" indent="-285750">
-              <a:buFont typeface="Arial" panose="020B0604020202020204" pitchFamily="34" charset="0"/>
-              <a:buChar char="•"/>
-            </a:pPr>
-            <a:r>
-              <a:rPr lang="fr-FR" sz="2400" dirty="0"/>
-              <a:t>Axe d’amélioration : organiser le CSS</a:t>
-            </a:r>
           </a:p>
         </p:txBody>
       </p:sp>
@@ -18227,7 +18369,7 @@
             <p:ph idx="1"/>
             <p:extLst>
               <p:ext uri="{D42A27DB-BD31-4B8C-83A1-F6EECF244321}">
-                <p14:modId xmlns:p14="http://schemas.microsoft.com/office/powerpoint/2010/main" val="175704451"/>
+                <p14:modId xmlns:p14="http://schemas.microsoft.com/office/powerpoint/2010/main" val="138955100"/>
               </p:ext>
             </p:extLst>
           </p:nvPr>

</xml_diff>

<commit_message>
Crée un 2e fichier css pour les MQ, mis fin à l'espace blanc à gauche, le footer peut pas etre à 100% pck ca décale tout à droite.
</commit_message>
<xml_diff>
--- a/AminaZahid_2_27042021/P2_03_support.pptx
+++ b/AminaZahid_2_27042021/P2_03_support.pptx
@@ -3079,17 +3079,25 @@
       </dgm:t>
     </dgm:pt>
     <dgm:pt modelId="{968A72F2-9271-406A-834C-9DEEE48F0128}">
-      <dgm:prSet/>
+      <dgm:prSet custT="1"/>
       <dgm:spPr/>
       <dgm:t>
         <a:bodyPr/>
         <a:lstStyle/>
         <a:p>
           <a:r>
-            <a:rPr lang="fr-FR"/>
-            <a:t>Format mobile : @media  (max-width: 480px)</a:t>
+            <a:rPr lang="fr-FR" sz="2000" dirty="0"/>
+            <a:t>Format mobile : @media  (max-</a:t>
           </a:r>
-          <a:endParaRPr lang="en-US"/>
+          <a:r>
+            <a:rPr lang="fr-FR" sz="2000" dirty="0" err="1"/>
+            <a:t>width</a:t>
+          </a:r>
+          <a:r>
+            <a:rPr lang="fr-FR" sz="2000" dirty="0"/>
+            <a:t>: 480px) ;</a:t>
+          </a:r>
+          <a:endParaRPr lang="en-US" sz="2000" dirty="0"/>
         </a:p>
       </dgm:t>
     </dgm:pt>
@@ -3116,65 +3124,65 @@
       </dgm:t>
     </dgm:pt>
     <dgm:pt modelId="{E2F0FFFC-E772-4308-9D5F-7EB75A9A8F19}">
-      <dgm:prSet/>
+      <dgm:prSet custT="1"/>
       <dgm:spPr/>
       <dgm:t>
         <a:bodyPr/>
         <a:lstStyle/>
         <a:p>
           <a:r>
-            <a:rPr lang="fr-FR" dirty="0"/>
+            <a:rPr lang="fr-FR" sz="2000" dirty="0"/>
             <a:t>Format Tablette vertical : @media </a:t>
           </a:r>
           <a:r>
-            <a:rPr lang="fr-FR" dirty="0" err="1"/>
+            <a:rPr lang="fr-FR" sz="2000" dirty="0" err="1"/>
             <a:t>only</a:t>
           </a:r>
           <a:r>
-            <a:rPr lang="fr-FR" dirty="0"/>
+            <a:rPr lang="fr-FR" sz="2000" dirty="0"/>
             <a:t> </a:t>
           </a:r>
           <a:r>
-            <a:rPr lang="fr-FR" dirty="0" err="1"/>
+            <a:rPr lang="fr-FR" sz="2000" dirty="0" err="1"/>
             <a:t>screen</a:t>
           </a:r>
           <a:r>
-            <a:rPr lang="fr-FR" dirty="0"/>
+            <a:rPr lang="fr-FR" sz="2000" dirty="0"/>
             <a:t> and (min-</a:t>
           </a:r>
           <a:r>
-            <a:rPr lang="fr-FR" dirty="0" err="1"/>
+            <a:rPr lang="fr-FR" sz="2000" dirty="0" err="1"/>
             <a:t>device</a:t>
           </a:r>
           <a:r>
-            <a:rPr lang="fr-FR" dirty="0"/>
+            <a:rPr lang="fr-FR" sz="2000" dirty="0"/>
             <a:t>-</a:t>
           </a:r>
           <a:r>
-            <a:rPr lang="fr-FR" dirty="0" err="1"/>
+            <a:rPr lang="fr-FR" sz="2000" dirty="0" err="1"/>
             <a:t>width</a:t>
           </a:r>
           <a:r>
-            <a:rPr lang="fr-FR" dirty="0"/>
+            <a:rPr lang="fr-FR" sz="2000" dirty="0"/>
             <a:t> : 768px) and (max-</a:t>
           </a:r>
           <a:r>
-            <a:rPr lang="fr-FR" dirty="0" err="1"/>
+            <a:rPr lang="fr-FR" sz="2000" dirty="0" err="1"/>
             <a:t>device</a:t>
           </a:r>
           <a:r>
-            <a:rPr lang="fr-FR" dirty="0"/>
+            <a:rPr lang="fr-FR" sz="2000" dirty="0"/>
             <a:t>-</a:t>
           </a:r>
           <a:r>
-            <a:rPr lang="fr-FR" dirty="0" err="1"/>
+            <a:rPr lang="fr-FR" sz="2000" dirty="0" err="1"/>
             <a:t>width</a:t>
           </a:r>
           <a:r>
-            <a:rPr lang="fr-FR" dirty="0"/>
-            <a:t> : 1024px). </a:t>
+            <a:rPr lang="fr-FR" sz="2000" dirty="0"/>
+            <a:t> : 1024px) and (orientation : portrait);</a:t>
           </a:r>
-          <a:endParaRPr lang="en-US" dirty="0"/>
+          <a:endParaRPr lang="en-US" sz="2000" dirty="0"/>
         </a:p>
       </dgm:t>
     </dgm:pt>
@@ -3201,34 +3209,175 @@
       </dgm:t>
     </dgm:pt>
     <dgm:pt modelId="{541602FB-6BD3-BC4F-8BD8-6FD7C53B3446}">
+      <dgm:prSet custT="1"/>
+      <dgm:spPr/>
+      <dgm:t>
+        <a:bodyPr/>
+        <a:lstStyle/>
+        <a:p>
+          <a:r>
+            <a:rPr lang="en-US" sz="2000" dirty="0"/>
+            <a:t>Format </a:t>
+          </a:r>
+          <a:r>
+            <a:rPr lang="en-US" sz="2000" dirty="0" err="1"/>
+            <a:t>Tablette</a:t>
+          </a:r>
+          <a:r>
+            <a:rPr lang="en-US" sz="2000" dirty="0"/>
+            <a:t> horizontal : </a:t>
+          </a:r>
+          <a:r>
+            <a:rPr lang="fr-FR" sz="2000" b="0" dirty="0"/>
+            <a:t>@media </a:t>
+          </a:r>
+          <a:r>
+            <a:rPr lang="fr-FR" sz="2000" b="0" dirty="0" err="1"/>
+            <a:t>only</a:t>
+          </a:r>
+          <a:r>
+            <a:rPr lang="fr-FR" sz="2000" b="0" dirty="0"/>
+            <a:t> </a:t>
+          </a:r>
+          <a:r>
+            <a:rPr lang="fr-FR" sz="2000" b="0" dirty="0" err="1"/>
+            <a:t>screen</a:t>
+          </a:r>
+          <a:r>
+            <a:rPr lang="fr-FR" sz="2000" b="0" dirty="0"/>
+            <a:t> and (min-</a:t>
+          </a:r>
+          <a:r>
+            <a:rPr lang="fr-FR" sz="2000" b="0" dirty="0" err="1"/>
+            <a:t>device</a:t>
+          </a:r>
+          <a:r>
+            <a:rPr lang="fr-FR" sz="2000" b="0" dirty="0"/>
+            <a:t>-</a:t>
+          </a:r>
+          <a:r>
+            <a:rPr lang="fr-FR" sz="2000" b="0" dirty="0" err="1"/>
+            <a:t>width</a:t>
+          </a:r>
+          <a:r>
+            <a:rPr lang="fr-FR" sz="2000" b="0" dirty="0"/>
+            <a:t> : 768px) and (max-</a:t>
+          </a:r>
+          <a:r>
+            <a:rPr lang="fr-FR" sz="2000" b="0" dirty="0" err="1"/>
+            <a:t>device</a:t>
+          </a:r>
+          <a:r>
+            <a:rPr lang="fr-FR" sz="2000" b="0" dirty="0"/>
+            <a:t>-</a:t>
+          </a:r>
+          <a:r>
+            <a:rPr lang="fr-FR" sz="2000" b="0" dirty="0" err="1"/>
+            <a:t>width</a:t>
+          </a:r>
+          <a:r>
+            <a:rPr lang="fr-FR" sz="2000" b="0" dirty="0"/>
+            <a:t> : 1024px) and (</a:t>
+          </a:r>
+          <a:r>
+            <a:rPr lang="fr-FR" sz="2000" b="0" dirty="0" err="1"/>
+            <a:t>orientation:landscape</a:t>
+          </a:r>
+          <a:r>
+            <a:rPr lang="fr-FR" sz="2000" b="0" dirty="0"/>
+            <a:t>).</a:t>
+          </a:r>
+          <a:endParaRPr lang="en-US" sz="2000" dirty="0"/>
+        </a:p>
+      </dgm:t>
+    </dgm:pt>
+    <dgm:pt modelId="{E5A427D3-A03A-7C45-AD1B-539A3BA173F5}" type="parTrans" cxnId="{B25F900C-E4C8-5A41-BA78-897F3373739B}">
       <dgm:prSet/>
       <dgm:spPr/>
       <dgm:t>
         <a:bodyPr/>
         <a:lstStyle/>
         <a:p>
-          <a:r>
-            <a:rPr lang="en-US" dirty="0"/>
-            <a:t>Format </a:t>
-          </a:r>
-          <a:r>
-            <a:rPr lang="en-US" dirty="0" err="1"/>
-            <a:t>Tablette</a:t>
-          </a:r>
-          <a:r>
-            <a:rPr lang="en-US" dirty="0"/>
-            <a:t> horizontal : </a:t>
-          </a:r>
+          <a:endParaRPr lang="fr-FR"/>
         </a:p>
       </dgm:t>
-    </dgm:pt>
-    <dgm:pt modelId="{E5A427D3-A03A-7C45-AD1B-539A3BA173F5}" type="parTrans" cxnId="{B25F900C-E4C8-5A41-BA78-897F3373739B}">
-      <dgm:prSet/>
-      <dgm:spPr/>
     </dgm:pt>
     <dgm:pt modelId="{9CD3CDE6-8448-504E-ACC5-4871E2556144}" type="sibTrans" cxnId="{B25F900C-E4C8-5A41-BA78-897F3373739B}">
       <dgm:prSet/>
       <dgm:spPr/>
+      <dgm:t>
+        <a:bodyPr/>
+        <a:lstStyle/>
+        <a:p>
+          <a:endParaRPr lang="fr-FR"/>
+        </a:p>
+      </dgm:t>
+    </dgm:pt>
+    <dgm:pt modelId="{28731A18-23AB-3342-B753-6B29447B4CAF}">
+      <dgm:prSet custT="1"/>
+      <dgm:spPr/>
+      <dgm:t>
+        <a:bodyPr/>
+        <a:lstStyle/>
+        <a:p>
+          <a:endParaRPr lang="en-US" sz="2000" dirty="0"/>
+        </a:p>
+      </dgm:t>
+    </dgm:pt>
+    <dgm:pt modelId="{35FCE408-27DC-4641-BB4A-D89AC3C6F024}" type="parTrans" cxnId="{683EBF7A-3950-B347-9B1F-5DC8CC34673E}">
+      <dgm:prSet/>
+      <dgm:spPr/>
+      <dgm:t>
+        <a:bodyPr/>
+        <a:lstStyle/>
+        <a:p>
+          <a:endParaRPr lang="fr-FR"/>
+        </a:p>
+      </dgm:t>
+    </dgm:pt>
+    <dgm:pt modelId="{688DF9AD-3E91-4343-81C4-AF6002AC3071}" type="sibTrans" cxnId="{683EBF7A-3950-B347-9B1F-5DC8CC34673E}">
+      <dgm:prSet/>
+      <dgm:spPr/>
+      <dgm:t>
+        <a:bodyPr/>
+        <a:lstStyle/>
+        <a:p>
+          <a:endParaRPr lang="fr-FR"/>
+        </a:p>
+      </dgm:t>
+    </dgm:pt>
+    <dgm:pt modelId="{F531E738-C064-F544-BBD1-9D613A15A8C6}">
+      <dgm:prSet custT="1"/>
+      <dgm:spPr/>
+      <dgm:t>
+        <a:bodyPr/>
+        <a:lstStyle/>
+        <a:p>
+          <a:endParaRPr lang="en-US" sz="2000" dirty="0"/>
+        </a:p>
+      </dgm:t>
+    </dgm:pt>
+    <dgm:pt modelId="{47841DF4-C8C1-4C47-BCE7-52CB376F2C46}" type="parTrans" cxnId="{F5C80367-619B-5E4F-AD31-B4A010FEB4CB}">
+      <dgm:prSet/>
+      <dgm:spPr/>
+      <dgm:t>
+        <a:bodyPr/>
+        <a:lstStyle/>
+        <a:p>
+          <a:endParaRPr lang="fr-FR"/>
+        </a:p>
+      </dgm:t>
+    </dgm:pt>
+    <dgm:pt modelId="{C7BD6A65-529B-2D48-983E-E1BAEFC6B3B8}" type="sibTrans" cxnId="{F5C80367-619B-5E4F-AD31-B4A010FEB4CB}">
+      <dgm:prSet/>
+      <dgm:spPr/>
+      <dgm:t>
+        <a:bodyPr/>
+        <a:lstStyle/>
+        <a:p>
+          <a:endParaRPr lang="fr-FR"/>
+        </a:p>
+      </dgm:t>
     </dgm:pt>
     <dgm:pt modelId="{7E27AEA5-3F6A-724B-BC80-3032374449EA}" type="pres">
       <dgm:prSet presAssocID="{46F8EC24-6670-4EF8-8F75-3684AB7255C9}" presName="linear" presStyleCnt="0">
@@ -3304,19 +3453,23 @@
     </dgm:pt>
   </dgm:ptLst>
   <dgm:cxnLst>
-    <dgm:cxn modelId="{B25F900C-E4C8-5A41-BA78-897F3373739B}" srcId="{7999E616-DE20-4815-9D50-0A56CCFC5959}" destId="{541602FB-6BD3-BC4F-8BD8-6FD7C53B3446}" srcOrd="2" destOrd="0" parTransId="{E5A427D3-A03A-7C45-AD1B-539A3BA173F5}" sibTransId="{9CD3CDE6-8448-504E-ACC5-4871E2556144}"/>
+    <dgm:cxn modelId="{B25F900C-E4C8-5A41-BA78-897F3373739B}" srcId="{7999E616-DE20-4815-9D50-0A56CCFC5959}" destId="{541602FB-6BD3-BC4F-8BD8-6FD7C53B3446}" srcOrd="4" destOrd="0" parTransId="{E5A427D3-A03A-7C45-AD1B-539A3BA173F5}" sibTransId="{9CD3CDE6-8448-504E-ACC5-4871E2556144}"/>
     <dgm:cxn modelId="{85E60D0F-BA6D-274E-8436-7EA8A9DEED7C}" type="presOf" srcId="{7999E616-DE20-4815-9D50-0A56CCFC5959}" destId="{72B7E57E-7E8C-234A-ADD0-31E0FDB68B53}" srcOrd="0" destOrd="0" presId="urn:microsoft.com/office/officeart/2005/8/layout/list1"/>
+    <dgm:cxn modelId="{9A5B7C34-1C3E-5846-B400-8011B13B578E}" type="presOf" srcId="{F531E738-C064-F544-BBD1-9D613A15A8C6}" destId="{14089D8C-40B2-F943-BA57-8D2926F9FCCE}" srcOrd="0" destOrd="3" presId="urn:microsoft.com/office/officeart/2005/8/layout/list1"/>
     <dgm:cxn modelId="{5896153C-93C6-44DD-A7C2-8024AE628E17}" srcId="{7999E616-DE20-4815-9D50-0A56CCFC5959}" destId="{968A72F2-9271-406A-834C-9DEEE48F0128}" srcOrd="0" destOrd="0" parTransId="{796FFA16-18A0-4A5A-BC98-08210F7AB629}" sibTransId="{D8221B2F-4468-4B84-92D2-8C914A4D7403}"/>
     <dgm:cxn modelId="{ACF98044-46CC-9344-8DB1-4166495F634B}" type="presOf" srcId="{926D5270-436D-4EE2-AC60-2BCA50AC36FD}" destId="{8AB532F2-EC9F-1E48-9F81-6224E18DBD6A}" srcOrd="0" destOrd="0" presId="urn:microsoft.com/office/officeart/2005/8/layout/list1"/>
-    <dgm:cxn modelId="{E7C48167-8FEF-4F87-B94B-FE86CAB58CC6}" srcId="{7999E616-DE20-4815-9D50-0A56CCFC5959}" destId="{E2F0FFFC-E772-4308-9D5F-7EB75A9A8F19}" srcOrd="1" destOrd="0" parTransId="{8035A9D8-8097-404C-9F28-F448D8665F5E}" sibTransId="{2A6483BC-EC96-4D92-B574-7670A5D42873}"/>
+    <dgm:cxn modelId="{B1F0A451-CD99-AA40-9AE9-4154CF72011E}" type="presOf" srcId="{28731A18-23AB-3342-B753-6B29447B4CAF}" destId="{14089D8C-40B2-F943-BA57-8D2926F9FCCE}" srcOrd="0" destOrd="1" presId="urn:microsoft.com/office/officeart/2005/8/layout/list1"/>
+    <dgm:cxn modelId="{F5C80367-619B-5E4F-AD31-B4A010FEB4CB}" srcId="{7999E616-DE20-4815-9D50-0A56CCFC5959}" destId="{F531E738-C064-F544-BBD1-9D613A15A8C6}" srcOrd="3" destOrd="0" parTransId="{47841DF4-C8C1-4C47-BCE7-52CB376F2C46}" sibTransId="{C7BD6A65-529B-2D48-983E-E1BAEFC6B3B8}"/>
+    <dgm:cxn modelId="{E7C48167-8FEF-4F87-B94B-FE86CAB58CC6}" srcId="{7999E616-DE20-4815-9D50-0A56CCFC5959}" destId="{E2F0FFFC-E772-4308-9D5F-7EB75A9A8F19}" srcOrd="2" destOrd="0" parTransId="{8035A9D8-8097-404C-9F28-F448D8665F5E}" sibTransId="{2A6483BC-EC96-4D92-B574-7670A5D42873}"/>
+    <dgm:cxn modelId="{683EBF7A-3950-B347-9B1F-5DC8CC34673E}" srcId="{7999E616-DE20-4815-9D50-0A56CCFC5959}" destId="{28731A18-23AB-3342-B753-6B29447B4CAF}" srcOrd="1" destOrd="0" parTransId="{35FCE408-27DC-4641-BB4A-D89AC3C6F024}" sibTransId="{688DF9AD-3E91-4343-81C4-AF6002AC3071}"/>
     <dgm:cxn modelId="{51D78B7E-C6A9-7849-A169-713578CB83B1}" type="presOf" srcId="{7999E616-DE20-4815-9D50-0A56CCFC5959}" destId="{CF79ABAC-2BCA-7A4B-B6FB-B7B589F72F54}" srcOrd="1" destOrd="0" presId="urn:microsoft.com/office/officeart/2005/8/layout/list1"/>
     <dgm:cxn modelId="{A11A589F-E662-4742-A75A-E9E3358C3925}" srcId="{46F8EC24-6670-4EF8-8F75-3684AB7255C9}" destId="{926D5270-436D-4EE2-AC60-2BCA50AC36FD}" srcOrd="0" destOrd="0" parTransId="{9C3ED568-B758-45FE-86D8-2829EBE7F43F}" sibTransId="{BA429434-5599-47B1-86B0-78C0965CAA4A}"/>
     <dgm:cxn modelId="{2EC740B0-EA89-B848-95B6-7ECEAA7F1A79}" type="presOf" srcId="{46F8EC24-6670-4EF8-8F75-3684AB7255C9}" destId="{7E27AEA5-3F6A-724B-BC80-3032374449EA}" srcOrd="0" destOrd="0" presId="urn:microsoft.com/office/officeart/2005/8/layout/list1"/>
     <dgm:cxn modelId="{32463EC7-F138-4B49-AFFD-5D0E0902257A}" srcId="{46F8EC24-6670-4EF8-8F75-3684AB7255C9}" destId="{7999E616-DE20-4815-9D50-0A56CCFC5959}" srcOrd="1" destOrd="0" parTransId="{7133251E-FBA5-40CD-9CA7-7D35A0968073}" sibTransId="{1A6145AB-CA35-492B-BE6B-727158F05BE0}"/>
     <dgm:cxn modelId="{C8E551E9-2846-2947-8FCE-9551E8702FB6}" type="presOf" srcId="{968A72F2-9271-406A-834C-9DEEE48F0128}" destId="{14089D8C-40B2-F943-BA57-8D2926F9FCCE}" srcOrd="0" destOrd="0" presId="urn:microsoft.com/office/officeart/2005/8/layout/list1"/>
-    <dgm:cxn modelId="{4C4FA6EB-CD96-4E4D-B82F-9750204645BC}" type="presOf" srcId="{E2F0FFFC-E772-4308-9D5F-7EB75A9A8F19}" destId="{14089D8C-40B2-F943-BA57-8D2926F9FCCE}" srcOrd="0" destOrd="1" presId="urn:microsoft.com/office/officeart/2005/8/layout/list1"/>
+    <dgm:cxn modelId="{4C4FA6EB-CD96-4E4D-B82F-9750204645BC}" type="presOf" srcId="{E2F0FFFC-E772-4308-9D5F-7EB75A9A8F19}" destId="{14089D8C-40B2-F943-BA57-8D2926F9FCCE}" srcOrd="0" destOrd="2" presId="urn:microsoft.com/office/officeart/2005/8/layout/list1"/>
     <dgm:cxn modelId="{626BDDF0-5A79-6844-9637-72CE477769DC}" type="presOf" srcId="{926D5270-436D-4EE2-AC60-2BCA50AC36FD}" destId="{39A1840A-37BA-2843-8C8C-34BF66852BCA}" srcOrd="1" destOrd="0" presId="urn:microsoft.com/office/officeart/2005/8/layout/list1"/>
-    <dgm:cxn modelId="{1578E7FB-5C4D-0A4E-9C33-42E636B3D7A8}" type="presOf" srcId="{541602FB-6BD3-BC4F-8BD8-6FD7C53B3446}" destId="{14089D8C-40B2-F943-BA57-8D2926F9FCCE}" srcOrd="0" destOrd="2" presId="urn:microsoft.com/office/officeart/2005/8/layout/list1"/>
+    <dgm:cxn modelId="{1578E7FB-5C4D-0A4E-9C33-42E636B3D7A8}" type="presOf" srcId="{541602FB-6BD3-BC4F-8BD8-6FD7C53B3446}" destId="{14089D8C-40B2-F943-BA57-8D2926F9FCCE}" srcOrd="0" destOrd="4" presId="urn:microsoft.com/office/officeart/2005/8/layout/list1"/>
     <dgm:cxn modelId="{C524A96E-6767-F74B-803C-41DD9A754588}" type="presParOf" srcId="{7E27AEA5-3F6A-724B-BC80-3032374449EA}" destId="{F52DE8A3-4E36-4E49-939A-10D98415E1C2}" srcOrd="0" destOrd="0" presId="urn:microsoft.com/office/officeart/2005/8/layout/list1"/>
     <dgm:cxn modelId="{771618F6-4A3C-174B-9F9E-B12135301F57}" type="presParOf" srcId="{F52DE8A3-4E36-4E49-939A-10D98415E1C2}" destId="{8AB532F2-EC9F-1E48-9F81-6224E18DBD6A}" srcOrd="0" destOrd="0" presId="urn:microsoft.com/office/officeart/2005/8/layout/list1"/>
     <dgm:cxn modelId="{AAC48592-F06D-7D4A-A7E9-3AC7F91E8171}" type="presParOf" srcId="{F52DE8A3-4E36-4E49-939A-10D98415E1C2}" destId="{39A1840A-37BA-2843-8C8C-34BF66852BCA}" srcOrd="1" destOrd="0" presId="urn:microsoft.com/office/officeart/2005/8/layout/list1"/>
@@ -4239,12 +4392,12 @@
         <a:fontRef idx="minor"/>
       </dsp:style>
       <dsp:txBody>
-        <a:bodyPr spcFirstLastPara="0" vert="horz" wrap="square" lIns="486128" tIns="541528" rIns="486128" bIns="184912" numCol="1" spcCol="1270" anchor="t" anchorCtr="0">
+        <a:bodyPr spcFirstLastPara="0" vert="horz" wrap="square" lIns="486128" tIns="541528" rIns="486128" bIns="142240" numCol="1" spcCol="1270" anchor="t" anchorCtr="0">
           <a:noAutofit/>
         </a:bodyPr>
         <a:lstStyle/>
         <a:p>
-          <a:pPr marL="228600" lvl="1" indent="-228600" algn="l" defTabSz="1155700">
+          <a:pPr marL="228600" lvl="1" indent="-228600" algn="l" defTabSz="889000">
             <a:lnSpc>
               <a:spcPct val="90000"/>
             </a:lnSpc>
@@ -4257,13 +4410,36 @@
             <a:buChar char="•"/>
           </a:pPr>
           <a:r>
-            <a:rPr lang="fr-FR" sz="2600" kern="1200"/>
-            <a:t>Format mobile : @media  (max-width: 480px)</a:t>
+            <a:rPr lang="fr-FR" sz="2000" kern="1200" dirty="0"/>
+            <a:t>Format mobile : @media  (max-</a:t>
           </a:r>
-          <a:endParaRPr lang="en-US" sz="2600" kern="1200"/>
+          <a:r>
+            <a:rPr lang="fr-FR" sz="2000" kern="1200" dirty="0" err="1"/>
+            <a:t>width</a:t>
+          </a:r>
+          <a:r>
+            <a:rPr lang="fr-FR" sz="2000" kern="1200" dirty="0"/>
+            <a:t>: 480px) ;</a:t>
+          </a:r>
+          <a:endParaRPr lang="en-US" sz="2000" kern="1200" dirty="0"/>
         </a:p>
         <a:p>
-          <a:pPr marL="228600" lvl="1" indent="-228600" algn="l" defTabSz="1155700">
+          <a:pPr marL="228600" lvl="1" indent="-228600" algn="l" defTabSz="889000">
+            <a:lnSpc>
+              <a:spcPct val="90000"/>
+            </a:lnSpc>
+            <a:spcBef>
+              <a:spcPct val="0"/>
+            </a:spcBef>
+            <a:spcAft>
+              <a:spcPct val="15000"/>
+            </a:spcAft>
+            <a:buChar char="•"/>
+          </a:pPr>
+          <a:endParaRPr lang="en-US" sz="2000" kern="1200" dirty="0"/>
+        </a:p>
+        <a:p>
+          <a:pPr marL="228600" lvl="1" indent="-228600" algn="l" defTabSz="889000">
             <a:lnSpc>
               <a:spcPct val="90000"/>
             </a:lnSpc>
@@ -4276,61 +4452,76 @@
             <a:buChar char="•"/>
           </a:pPr>
           <a:r>
-            <a:rPr lang="fr-FR" sz="2600" kern="1200" dirty="0"/>
+            <a:rPr lang="fr-FR" sz="2000" kern="1200" dirty="0"/>
             <a:t>Format Tablette vertical : @media </a:t>
           </a:r>
           <a:r>
-            <a:rPr lang="fr-FR" sz="2600" kern="1200" dirty="0" err="1"/>
+            <a:rPr lang="fr-FR" sz="2000" kern="1200" dirty="0" err="1"/>
             <a:t>only</a:t>
           </a:r>
           <a:r>
-            <a:rPr lang="fr-FR" sz="2600" kern="1200" dirty="0"/>
+            <a:rPr lang="fr-FR" sz="2000" kern="1200" dirty="0"/>
             <a:t> </a:t>
           </a:r>
           <a:r>
-            <a:rPr lang="fr-FR" sz="2600" kern="1200" dirty="0" err="1"/>
+            <a:rPr lang="fr-FR" sz="2000" kern="1200" dirty="0" err="1"/>
             <a:t>screen</a:t>
           </a:r>
           <a:r>
-            <a:rPr lang="fr-FR" sz="2600" kern="1200" dirty="0"/>
+            <a:rPr lang="fr-FR" sz="2000" kern="1200" dirty="0"/>
             <a:t> and (min-</a:t>
           </a:r>
           <a:r>
-            <a:rPr lang="fr-FR" sz="2600" kern="1200" dirty="0" err="1"/>
+            <a:rPr lang="fr-FR" sz="2000" kern="1200" dirty="0" err="1"/>
             <a:t>device</a:t>
           </a:r>
           <a:r>
-            <a:rPr lang="fr-FR" sz="2600" kern="1200" dirty="0"/>
+            <a:rPr lang="fr-FR" sz="2000" kern="1200" dirty="0"/>
             <a:t>-</a:t>
           </a:r>
           <a:r>
-            <a:rPr lang="fr-FR" sz="2600" kern="1200" dirty="0" err="1"/>
+            <a:rPr lang="fr-FR" sz="2000" kern="1200" dirty="0" err="1"/>
             <a:t>width</a:t>
           </a:r>
           <a:r>
-            <a:rPr lang="fr-FR" sz="2600" kern="1200" dirty="0"/>
+            <a:rPr lang="fr-FR" sz="2000" kern="1200" dirty="0"/>
             <a:t> : 768px) and (max-</a:t>
           </a:r>
           <a:r>
-            <a:rPr lang="fr-FR" sz="2600" kern="1200" dirty="0" err="1"/>
+            <a:rPr lang="fr-FR" sz="2000" kern="1200" dirty="0" err="1"/>
             <a:t>device</a:t>
           </a:r>
           <a:r>
-            <a:rPr lang="fr-FR" sz="2600" kern="1200" dirty="0"/>
+            <a:rPr lang="fr-FR" sz="2000" kern="1200" dirty="0"/>
             <a:t>-</a:t>
           </a:r>
           <a:r>
-            <a:rPr lang="fr-FR" sz="2600" kern="1200" dirty="0" err="1"/>
+            <a:rPr lang="fr-FR" sz="2000" kern="1200" dirty="0" err="1"/>
             <a:t>width</a:t>
           </a:r>
           <a:r>
-            <a:rPr lang="fr-FR" sz="2600" kern="1200" dirty="0"/>
-            <a:t> : 1024px). </a:t>
+            <a:rPr lang="fr-FR" sz="2000" kern="1200" dirty="0"/>
+            <a:t> : 1024px) and (orientation : portrait);</a:t>
           </a:r>
-          <a:endParaRPr lang="en-US" sz="2600" kern="1200" dirty="0"/>
+          <a:endParaRPr lang="en-US" sz="2000" kern="1200" dirty="0"/>
         </a:p>
         <a:p>
-          <a:pPr marL="228600" lvl="1" indent="-228600" algn="l" defTabSz="1155700">
+          <a:pPr marL="228600" lvl="1" indent="-228600" algn="l" defTabSz="889000">
+            <a:lnSpc>
+              <a:spcPct val="90000"/>
+            </a:lnSpc>
+            <a:spcBef>
+              <a:spcPct val="0"/>
+            </a:spcBef>
+            <a:spcAft>
+              <a:spcPct val="15000"/>
+            </a:spcAft>
+            <a:buChar char="•"/>
+          </a:pPr>
+          <a:endParaRPr lang="en-US" sz="2000" kern="1200" dirty="0"/>
+        </a:p>
+        <a:p>
+          <a:pPr marL="228600" lvl="1" indent="-228600" algn="l" defTabSz="889000">
             <a:lnSpc>
               <a:spcPct val="90000"/>
             </a:lnSpc>
@@ -4343,17 +4534,78 @@
             <a:buChar char="•"/>
           </a:pPr>
           <a:r>
-            <a:rPr lang="en-US" sz="2600" kern="1200" dirty="0"/>
+            <a:rPr lang="en-US" sz="2000" kern="1200" dirty="0"/>
             <a:t>Format </a:t>
           </a:r>
           <a:r>
-            <a:rPr lang="en-US" sz="2600" kern="1200" dirty="0" err="1"/>
+            <a:rPr lang="en-US" sz="2000" kern="1200" dirty="0" err="1"/>
             <a:t>Tablette</a:t>
           </a:r>
           <a:r>
-            <a:rPr lang="en-US" sz="2600" kern="1200" dirty="0"/>
+            <a:rPr lang="en-US" sz="2000" kern="1200" dirty="0"/>
             <a:t> horizontal : </a:t>
           </a:r>
+          <a:r>
+            <a:rPr lang="fr-FR" sz="2000" b="0" kern="1200" dirty="0"/>
+            <a:t>@media </a:t>
+          </a:r>
+          <a:r>
+            <a:rPr lang="fr-FR" sz="2000" b="0" kern="1200" dirty="0" err="1"/>
+            <a:t>only</a:t>
+          </a:r>
+          <a:r>
+            <a:rPr lang="fr-FR" sz="2000" b="0" kern="1200" dirty="0"/>
+            <a:t> </a:t>
+          </a:r>
+          <a:r>
+            <a:rPr lang="fr-FR" sz="2000" b="0" kern="1200" dirty="0" err="1"/>
+            <a:t>screen</a:t>
+          </a:r>
+          <a:r>
+            <a:rPr lang="fr-FR" sz="2000" b="0" kern="1200" dirty="0"/>
+            <a:t> and (min-</a:t>
+          </a:r>
+          <a:r>
+            <a:rPr lang="fr-FR" sz="2000" b="0" kern="1200" dirty="0" err="1"/>
+            <a:t>device</a:t>
+          </a:r>
+          <a:r>
+            <a:rPr lang="fr-FR" sz="2000" b="0" kern="1200" dirty="0"/>
+            <a:t>-</a:t>
+          </a:r>
+          <a:r>
+            <a:rPr lang="fr-FR" sz="2000" b="0" kern="1200" dirty="0" err="1"/>
+            <a:t>width</a:t>
+          </a:r>
+          <a:r>
+            <a:rPr lang="fr-FR" sz="2000" b="0" kern="1200" dirty="0"/>
+            <a:t> : 768px) and (max-</a:t>
+          </a:r>
+          <a:r>
+            <a:rPr lang="fr-FR" sz="2000" b="0" kern="1200" dirty="0" err="1"/>
+            <a:t>device</a:t>
+          </a:r>
+          <a:r>
+            <a:rPr lang="fr-FR" sz="2000" b="0" kern="1200" dirty="0"/>
+            <a:t>-</a:t>
+          </a:r>
+          <a:r>
+            <a:rPr lang="fr-FR" sz="2000" b="0" kern="1200" dirty="0" err="1"/>
+            <a:t>width</a:t>
+          </a:r>
+          <a:r>
+            <a:rPr lang="fr-FR" sz="2000" b="0" kern="1200" dirty="0"/>
+            <a:t> : 1024px) and (</a:t>
+          </a:r>
+          <a:r>
+            <a:rPr lang="fr-FR" sz="2000" b="0" kern="1200" dirty="0" err="1"/>
+            <a:t>orientation:landscape</a:t>
+          </a:r>
+          <a:r>
+            <a:rPr lang="fr-FR" sz="2000" b="0" kern="1200" dirty="0"/>
+            <a:t>).</a:t>
+          </a:r>
+          <a:endParaRPr lang="en-US" sz="2000" kern="1200" dirty="0"/>
         </a:p>
       </dsp:txBody>
       <dsp:txXfrm>
@@ -9053,9 +9305,9 @@
           <a:bodyPr/>
           <a:lstStyle/>
           <a:p>
-            <a:fld id="{6E628939-5BA2-A04E-93A6-C3BED22BA497}" type="datetimeFigureOut">
+            <a:fld id="{4DD0A55C-7375-6148-8205-EDCD9AEDB2FE}" type="datetime1">
               <a:rPr lang="fr-FR" smtClean="0"/>
-              <a:t>21/06/2021</a:t>
+              <a:t>22/06/2021</a:t>
             </a:fld>
             <a:endParaRPr lang="fr-FR"/>
           </a:p>
@@ -9223,9 +9475,9 @@
           <a:bodyPr/>
           <a:lstStyle/>
           <a:p>
-            <a:fld id="{6E628939-5BA2-A04E-93A6-C3BED22BA497}" type="datetimeFigureOut">
+            <a:fld id="{F4AFC02D-EA3E-0A48-8193-F57317395774}" type="datetime1">
               <a:rPr lang="fr-FR" smtClean="0"/>
-              <a:t>21/06/2021</a:t>
+              <a:t>22/06/2021</a:t>
             </a:fld>
             <a:endParaRPr lang="fr-FR"/>
           </a:p>
@@ -9403,9 +9655,9 @@
           <a:bodyPr/>
           <a:lstStyle/>
           <a:p>
-            <a:fld id="{6E628939-5BA2-A04E-93A6-C3BED22BA497}" type="datetimeFigureOut">
+            <a:fld id="{183C42D8-E58B-1444-9D2C-B1CF23C02479}" type="datetime1">
               <a:rPr lang="fr-FR" smtClean="0"/>
-              <a:t>21/06/2021</a:t>
+              <a:t>22/06/2021</a:t>
             </a:fld>
             <a:endParaRPr lang="fr-FR"/>
           </a:p>
@@ -9573,9 +9825,9 @@
           <a:bodyPr/>
           <a:lstStyle/>
           <a:p>
-            <a:fld id="{6E628939-5BA2-A04E-93A6-C3BED22BA497}" type="datetimeFigureOut">
+            <a:fld id="{A064A94A-BE30-5B43-B50C-F644FC25E51E}" type="datetime1">
               <a:rPr lang="fr-FR" smtClean="0"/>
-              <a:t>21/06/2021</a:t>
+              <a:t>22/06/2021</a:t>
             </a:fld>
             <a:endParaRPr lang="fr-FR"/>
           </a:p>
@@ -9819,9 +10071,9 @@
           <a:bodyPr/>
           <a:lstStyle/>
           <a:p>
-            <a:fld id="{6E628939-5BA2-A04E-93A6-C3BED22BA497}" type="datetimeFigureOut">
+            <a:fld id="{601F4E3B-1EF5-E342-98B9-CB39BCED88B9}" type="datetime1">
               <a:rPr lang="fr-FR" smtClean="0"/>
-              <a:t>21/06/2021</a:t>
+              <a:t>22/06/2021</a:t>
             </a:fld>
             <a:endParaRPr lang="fr-FR"/>
           </a:p>
@@ -10051,9 +10303,9 @@
           <a:bodyPr/>
           <a:lstStyle/>
           <a:p>
-            <a:fld id="{6E628939-5BA2-A04E-93A6-C3BED22BA497}" type="datetimeFigureOut">
+            <a:fld id="{766B28CE-A18E-4244-B4F0-7220A60D04CE}" type="datetime1">
               <a:rPr lang="fr-FR" smtClean="0"/>
-              <a:t>21/06/2021</a:t>
+              <a:t>22/06/2021</a:t>
             </a:fld>
             <a:endParaRPr lang="fr-FR"/>
           </a:p>
@@ -10418,9 +10670,9 @@
           <a:bodyPr/>
           <a:lstStyle/>
           <a:p>
-            <a:fld id="{6E628939-5BA2-A04E-93A6-C3BED22BA497}" type="datetimeFigureOut">
+            <a:fld id="{59E45368-E0B3-8542-9F17-3A483E1AA53C}" type="datetime1">
               <a:rPr lang="fr-FR" smtClean="0"/>
-              <a:t>21/06/2021</a:t>
+              <a:t>22/06/2021</a:t>
             </a:fld>
             <a:endParaRPr lang="fr-FR"/>
           </a:p>
@@ -10536,9 +10788,9 @@
           <a:bodyPr/>
           <a:lstStyle/>
           <a:p>
-            <a:fld id="{6E628939-5BA2-A04E-93A6-C3BED22BA497}" type="datetimeFigureOut">
+            <a:fld id="{EBE50374-EAD3-9A4A-8176-EB2D114ADEBE}" type="datetime1">
               <a:rPr lang="fr-FR" smtClean="0"/>
-              <a:t>21/06/2021</a:t>
+              <a:t>22/06/2021</a:t>
             </a:fld>
             <a:endParaRPr lang="fr-FR"/>
           </a:p>
@@ -10631,9 +10883,9 @@
           <a:bodyPr/>
           <a:lstStyle/>
           <a:p>
-            <a:fld id="{6E628939-5BA2-A04E-93A6-C3BED22BA497}" type="datetimeFigureOut">
+            <a:fld id="{262BABFE-D5AA-4549-9400-F12043EAA693}" type="datetime1">
               <a:rPr lang="fr-FR" smtClean="0"/>
-              <a:t>21/06/2021</a:t>
+              <a:t>22/06/2021</a:t>
             </a:fld>
             <a:endParaRPr lang="fr-FR"/>
           </a:p>
@@ -10908,9 +11160,9 @@
           <a:bodyPr/>
           <a:lstStyle/>
           <a:p>
-            <a:fld id="{6E628939-5BA2-A04E-93A6-C3BED22BA497}" type="datetimeFigureOut">
+            <a:fld id="{95E9B43C-C426-8B4C-931E-22B070B7F87C}" type="datetime1">
               <a:rPr lang="fr-FR" smtClean="0"/>
-              <a:t>21/06/2021</a:t>
+              <a:t>22/06/2021</a:t>
             </a:fld>
             <a:endParaRPr lang="fr-FR"/>
           </a:p>
@@ -11165,9 +11417,9 @@
           <a:bodyPr/>
           <a:lstStyle/>
           <a:p>
-            <a:fld id="{6E628939-5BA2-A04E-93A6-C3BED22BA497}" type="datetimeFigureOut">
+            <a:fld id="{DC54CA3B-B41C-D74E-8C2C-7300311E224E}" type="datetime1">
               <a:rPr lang="fr-FR" smtClean="0"/>
-              <a:t>21/06/2021</a:t>
+              <a:t>22/06/2021</a:t>
             </a:fld>
             <a:endParaRPr lang="fr-FR"/>
           </a:p>
@@ -11378,9 +11630,9 @@
             </a:lvl1pPr>
           </a:lstStyle>
           <a:p>
-            <a:fld id="{6E628939-5BA2-A04E-93A6-C3BED22BA497}" type="datetimeFigureOut">
+            <a:fld id="{EB738382-388C-AE4E-8FFC-DEB66643AB42}" type="datetime1">
               <a:rPr lang="fr-FR" smtClean="0"/>
-              <a:t>21/06/2021</a:t>
+              <a:t>22/06/2021</a:t>
             </a:fld>
             <a:endParaRPr lang="fr-FR"/>
           </a:p>
@@ -11485,6 +11737,7 @@
     <p:sldLayoutId id="2147483694" r:id="rId10"/>
     <p:sldLayoutId id="2147483695" r:id="rId11"/>
   </p:sldLayoutIdLst>
+  <p:hf hdr="0" ftr="0" dt="0"/>
   <p:txStyles>
     <p:titleStyle>
       <a:lvl1pPr algn="l" defTabSz="914400" rtl="0" eaLnBrk="1" latinLnBrk="0" hangingPunct="1">
@@ -12320,6 +12573,35 @@
           </a:prstGeom>
         </p:spPr>
       </p:pic>
+      <p:sp>
+        <p:nvSpPr>
+          <p:cNvPr id="7" name="Espace réservé du numéro de diapositive 6">
+            <a:extLst>
+              <a:ext uri="{FF2B5EF4-FFF2-40B4-BE49-F238E27FC236}">
+                <a16:creationId xmlns:a16="http://schemas.microsoft.com/office/drawing/2014/main" id="{DE11DFB5-3A25-6343-AD07-0F03DFBA8CF4}"/>
+              </a:ext>
+            </a:extLst>
+          </p:cNvPr>
+          <p:cNvSpPr>
+            <a:spLocks noGrp="1"/>
+          </p:cNvSpPr>
+          <p:nvPr>
+            <p:ph type="sldNum" sz="quarter" idx="12"/>
+          </p:nvPr>
+        </p:nvSpPr>
+        <p:spPr/>
+        <p:txBody>
+          <a:bodyPr/>
+          <a:lstStyle/>
+          <a:p>
+            <a:fld id="{2998BCD1-668E-5F49-8470-CD83C6A10F3B}" type="slidenum">
+              <a:rPr lang="fr-FR" smtClean="0"/>
+              <a:t>1</a:t>
+            </a:fld>
+            <a:endParaRPr lang="fr-FR"/>
+          </a:p>
+        </p:txBody>
+      </p:sp>
     </p:spTree>
     <p:extLst>
       <p:ext uri="{BB962C8B-B14F-4D97-AF65-F5344CB8AC3E}">
@@ -13372,7 +13654,7 @@
         <p:spPr>
           <a:xfrm>
             <a:off x="4709796" y="2003136"/>
-            <a:ext cx="5805804" cy="1569660"/>
+            <a:ext cx="5805804" cy="3416320"/>
           </a:xfrm>
           <a:prstGeom prst="rect">
             <a:avLst/>
@@ -13404,13 +13686,42 @@
             </a:pPr>
             <a:r>
               <a:rPr lang="fr-FR" sz="2400" dirty="0"/>
-              <a:t>Faire mes premiers pas dans le développement </a:t>
+              <a:t>Faire mes premiers pas dans le développement web </a:t>
             </a:r>
+          </a:p>
+          <a:p>
+            <a:pPr marL="285750" indent="-285750">
+              <a:buFont typeface="Arial" panose="020B0604020202020204" pitchFamily="34" charset="0"/>
+              <a:buChar char="•"/>
+            </a:pPr>
+            <a:endParaRPr lang="fr-FR" sz="2400" dirty="0"/>
+          </a:p>
+          <a:p>
+            <a:pPr marL="285750" indent="-285750">
+              <a:buFont typeface="Arial" panose="020B0604020202020204" pitchFamily="34" charset="0"/>
+              <a:buChar char="•"/>
+            </a:pPr>
             <a:r>
-              <a:rPr lang="fr-FR" sz="2400"/>
-              <a:t>web </a:t>
+              <a:rPr lang="fr-FR" sz="2400" dirty="0"/>
+              <a:t>Intégrer du contenu conformément à une maquette</a:t>
             </a:r>
+          </a:p>
+          <a:p>
+            <a:pPr marL="285750" indent="-285750">
+              <a:buFont typeface="Arial" panose="020B0604020202020204" pitchFamily="34" charset="0"/>
+              <a:buChar char="•"/>
+            </a:pPr>
             <a:endParaRPr lang="fr-FR" sz="2400" dirty="0"/>
+          </a:p>
+          <a:p>
+            <a:pPr marL="285750" indent="-285750">
+              <a:buFont typeface="Arial" panose="020B0604020202020204" pitchFamily="34" charset="0"/>
+              <a:buChar char="•"/>
+            </a:pPr>
+            <a:r>
+              <a:rPr lang="fr-FR" sz="2400" dirty="0"/>
+              <a:t>Implémenter une interface responsive</a:t>
+            </a:r>
           </a:p>
         </p:txBody>
       </p:sp>
@@ -13444,6 +13755,35 @@
           </a:prstGeom>
         </p:spPr>
       </p:pic>
+      <p:sp>
+        <p:nvSpPr>
+          <p:cNvPr id="5" name="Espace réservé du numéro de diapositive 4">
+            <a:extLst>
+              <a:ext uri="{FF2B5EF4-FFF2-40B4-BE49-F238E27FC236}">
+                <a16:creationId xmlns:a16="http://schemas.microsoft.com/office/drawing/2014/main" id="{B7A19B33-DD18-0841-9864-8E69CA7EAB36}"/>
+              </a:ext>
+            </a:extLst>
+          </p:cNvPr>
+          <p:cNvSpPr>
+            <a:spLocks noGrp="1"/>
+          </p:cNvSpPr>
+          <p:nvPr>
+            <p:ph type="sldNum" sz="quarter" idx="12"/>
+          </p:nvPr>
+        </p:nvSpPr>
+        <p:spPr/>
+        <p:txBody>
+          <a:bodyPr/>
+          <a:lstStyle/>
+          <a:p>
+            <a:fld id="{2998BCD1-668E-5F49-8470-CD83C6A10F3B}" type="slidenum">
+              <a:rPr lang="fr-FR" smtClean="0"/>
+              <a:t>10</a:t>
+            </a:fld>
+            <a:endParaRPr lang="fr-FR"/>
+          </a:p>
+        </p:txBody>
+      </p:sp>
     </p:spTree>
     <p:extLst>
       <p:ext uri="{BB962C8B-B14F-4D97-AF65-F5344CB8AC3E}">
@@ -14670,6 +15010,35 @@
           </a:p>
         </p:txBody>
       </p:sp>
+      <p:sp>
+        <p:nvSpPr>
+          <p:cNvPr id="3" name="Espace réservé du numéro de diapositive 2">
+            <a:extLst>
+              <a:ext uri="{FF2B5EF4-FFF2-40B4-BE49-F238E27FC236}">
+                <a16:creationId xmlns:a16="http://schemas.microsoft.com/office/drawing/2014/main" id="{7E06966B-6D74-E04B-9EBE-81916A708EDF}"/>
+              </a:ext>
+            </a:extLst>
+          </p:cNvPr>
+          <p:cNvSpPr>
+            <a:spLocks noGrp="1"/>
+          </p:cNvSpPr>
+          <p:nvPr>
+            <p:ph type="sldNum" sz="quarter" idx="12"/>
+          </p:nvPr>
+        </p:nvSpPr>
+        <p:spPr/>
+        <p:txBody>
+          <a:bodyPr/>
+          <a:lstStyle/>
+          <a:p>
+            <a:fld id="{2998BCD1-668E-5F49-8470-CD83C6A10F3B}" type="slidenum">
+              <a:rPr lang="fr-FR" smtClean="0"/>
+              <a:t>11</a:t>
+            </a:fld>
+            <a:endParaRPr lang="fr-FR"/>
+          </a:p>
+        </p:txBody>
+      </p:sp>
     </p:spTree>
     <p:extLst>
       <p:ext uri="{BB962C8B-B14F-4D97-AF65-F5344CB8AC3E}">
@@ -14838,6 +15207,35 @@
           </a:prstGeom>
         </p:spPr>
       </p:pic>
+      <p:sp>
+        <p:nvSpPr>
+          <p:cNvPr id="3" name="Espace réservé du numéro de diapositive 2">
+            <a:extLst>
+              <a:ext uri="{FF2B5EF4-FFF2-40B4-BE49-F238E27FC236}">
+                <a16:creationId xmlns:a16="http://schemas.microsoft.com/office/drawing/2014/main" id="{BC1923A4-6578-634A-9B18-BA3B2A0744DE}"/>
+              </a:ext>
+            </a:extLst>
+          </p:cNvPr>
+          <p:cNvSpPr>
+            <a:spLocks noGrp="1"/>
+          </p:cNvSpPr>
+          <p:nvPr>
+            <p:ph type="sldNum" sz="quarter" idx="12"/>
+          </p:nvPr>
+        </p:nvSpPr>
+        <p:spPr/>
+        <p:txBody>
+          <a:bodyPr/>
+          <a:lstStyle/>
+          <a:p>
+            <a:fld id="{2998BCD1-668E-5F49-8470-CD83C6A10F3B}" type="slidenum">
+              <a:rPr lang="fr-FR" smtClean="0"/>
+              <a:t>2</a:t>
+            </a:fld>
+            <a:endParaRPr lang="fr-FR"/>
+          </a:p>
+        </p:txBody>
+      </p:sp>
     </p:spTree>
     <p:extLst>
       <p:ext uri="{BB962C8B-B14F-4D97-AF65-F5344CB8AC3E}">
@@ -15375,6 +15773,35 @@
           </a:extLst>
         </p:spPr>
       </p:pic>
+      <p:sp>
+        <p:nvSpPr>
+          <p:cNvPr id="6" name="Espace réservé du numéro de diapositive 5">
+            <a:extLst>
+              <a:ext uri="{FF2B5EF4-FFF2-40B4-BE49-F238E27FC236}">
+                <a16:creationId xmlns:a16="http://schemas.microsoft.com/office/drawing/2014/main" id="{E6194E63-FD34-E04C-957C-9B73E717D903}"/>
+              </a:ext>
+            </a:extLst>
+          </p:cNvPr>
+          <p:cNvSpPr>
+            <a:spLocks noGrp="1"/>
+          </p:cNvSpPr>
+          <p:nvPr>
+            <p:ph type="sldNum" sz="quarter" idx="12"/>
+          </p:nvPr>
+        </p:nvSpPr>
+        <p:spPr/>
+        <p:txBody>
+          <a:bodyPr/>
+          <a:lstStyle/>
+          <a:p>
+            <a:fld id="{2998BCD1-668E-5F49-8470-CD83C6A10F3B}" type="slidenum">
+              <a:rPr lang="fr-FR" smtClean="0"/>
+              <a:t>3</a:t>
+            </a:fld>
+            <a:endParaRPr lang="fr-FR" dirty="0"/>
+          </a:p>
+        </p:txBody>
+      </p:sp>
     </p:spTree>
     <p:extLst>
       <p:ext uri="{BB962C8B-B14F-4D97-AF65-F5344CB8AC3E}">
@@ -15986,6 +16413,35 @@
           </a:xfrm>
         </p:spPr>
       </p:pic>
+      <p:sp>
+        <p:nvSpPr>
+          <p:cNvPr id="5" name="Espace réservé du numéro de diapositive 4">
+            <a:extLst>
+              <a:ext uri="{FF2B5EF4-FFF2-40B4-BE49-F238E27FC236}">
+                <a16:creationId xmlns:a16="http://schemas.microsoft.com/office/drawing/2014/main" id="{B9806EB5-727F-704B-973D-03BD9D85DAFC}"/>
+              </a:ext>
+            </a:extLst>
+          </p:cNvPr>
+          <p:cNvSpPr>
+            <a:spLocks noGrp="1"/>
+          </p:cNvSpPr>
+          <p:nvPr>
+            <p:ph type="sldNum" sz="quarter" idx="12"/>
+          </p:nvPr>
+        </p:nvSpPr>
+        <p:spPr/>
+        <p:txBody>
+          <a:bodyPr/>
+          <a:lstStyle/>
+          <a:p>
+            <a:fld id="{2998BCD1-668E-5F49-8470-CD83C6A10F3B}" type="slidenum">
+              <a:rPr lang="fr-FR" smtClean="0"/>
+              <a:t>4</a:t>
+            </a:fld>
+            <a:endParaRPr lang="fr-FR"/>
+          </a:p>
+        </p:txBody>
+      </p:sp>
     </p:spTree>
     <p:extLst>
       <p:ext uri="{BB962C8B-B14F-4D97-AF65-F5344CB8AC3E}">
@@ -16794,6 +17250,35 @@
           </a:p>
         </p:txBody>
       </p:sp>
+      <p:sp>
+        <p:nvSpPr>
+          <p:cNvPr id="3" name="Espace réservé du numéro de diapositive 2">
+            <a:extLst>
+              <a:ext uri="{FF2B5EF4-FFF2-40B4-BE49-F238E27FC236}">
+                <a16:creationId xmlns:a16="http://schemas.microsoft.com/office/drawing/2014/main" id="{BEA6F006-E42B-A246-991B-4110F0CC025C}"/>
+              </a:ext>
+            </a:extLst>
+          </p:cNvPr>
+          <p:cNvSpPr>
+            <a:spLocks noGrp="1"/>
+          </p:cNvSpPr>
+          <p:nvPr>
+            <p:ph type="sldNum" sz="quarter" idx="12"/>
+          </p:nvPr>
+        </p:nvSpPr>
+        <p:spPr/>
+        <p:txBody>
+          <a:bodyPr/>
+          <a:lstStyle/>
+          <a:p>
+            <a:fld id="{2998BCD1-668E-5F49-8470-CD83C6A10F3B}" type="slidenum">
+              <a:rPr lang="fr-FR" smtClean="0"/>
+              <a:t>5</a:t>
+            </a:fld>
+            <a:endParaRPr lang="fr-FR"/>
+          </a:p>
+        </p:txBody>
+      </p:sp>
     </p:spTree>
     <p:extLst>
       <p:ext uri="{BB962C8B-B14F-4D97-AF65-F5344CB8AC3E}">
@@ -17452,6 +17937,35 @@
               <a:t>Utilisation des commentaires et indentation</a:t>
             </a:r>
             <a:endParaRPr lang="fr-FR" dirty="0"/>
+          </a:p>
+        </p:txBody>
+      </p:sp>
+      <p:sp>
+        <p:nvSpPr>
+          <p:cNvPr id="2" name="Espace réservé du numéro de diapositive 1">
+            <a:extLst>
+              <a:ext uri="{FF2B5EF4-FFF2-40B4-BE49-F238E27FC236}">
+                <a16:creationId xmlns:a16="http://schemas.microsoft.com/office/drawing/2014/main" id="{1E0A9E8B-A61D-444F-931E-DD1577157842}"/>
+              </a:ext>
+            </a:extLst>
+          </p:cNvPr>
+          <p:cNvSpPr>
+            <a:spLocks noGrp="1"/>
+          </p:cNvSpPr>
+          <p:nvPr>
+            <p:ph type="sldNum" sz="quarter" idx="12"/>
+          </p:nvPr>
+        </p:nvSpPr>
+        <p:spPr/>
+        <p:txBody>
+          <a:bodyPr/>
+          <a:lstStyle/>
+          <a:p>
+            <a:fld id="{2998BCD1-668E-5F49-8470-CD83C6A10F3B}" type="slidenum">
+              <a:rPr lang="fr-FR" smtClean="0"/>
+              <a:t>6</a:t>
+            </a:fld>
+            <a:endParaRPr lang="fr-FR"/>
           </a:p>
         </p:txBody>
       </p:sp>
@@ -18271,6 +18785,35 @@
           </a:prstGeom>
         </p:spPr>
       </p:pic>
+      <p:sp>
+        <p:nvSpPr>
+          <p:cNvPr id="3" name="Espace réservé du numéro de diapositive 2">
+            <a:extLst>
+              <a:ext uri="{FF2B5EF4-FFF2-40B4-BE49-F238E27FC236}">
+                <a16:creationId xmlns:a16="http://schemas.microsoft.com/office/drawing/2014/main" id="{8FC4A710-BC4C-BE4F-BA34-871D52D904F1}"/>
+              </a:ext>
+            </a:extLst>
+          </p:cNvPr>
+          <p:cNvSpPr>
+            <a:spLocks noGrp="1"/>
+          </p:cNvSpPr>
+          <p:nvPr>
+            <p:ph type="sldNum" sz="quarter" idx="12"/>
+          </p:nvPr>
+        </p:nvSpPr>
+        <p:spPr/>
+        <p:txBody>
+          <a:bodyPr/>
+          <a:lstStyle/>
+          <a:p>
+            <a:fld id="{2998BCD1-668E-5F49-8470-CD83C6A10F3B}" type="slidenum">
+              <a:rPr lang="fr-FR" smtClean="0"/>
+              <a:t>7</a:t>
+            </a:fld>
+            <a:endParaRPr lang="fr-FR"/>
+          </a:p>
+        </p:txBody>
+      </p:sp>
     </p:spTree>
     <p:extLst>
       <p:ext uri="{BB962C8B-B14F-4D97-AF65-F5344CB8AC3E}">
@@ -18369,7 +18912,7 @@
             <p:ph idx="1"/>
             <p:extLst>
               <p:ext uri="{D42A27DB-BD31-4B8C-83A1-F6EECF244321}">
-                <p14:modId xmlns:p14="http://schemas.microsoft.com/office/powerpoint/2010/main" val="138955100"/>
+                <p14:modId xmlns:p14="http://schemas.microsoft.com/office/powerpoint/2010/main" val="2097558018"/>
               </p:ext>
             </p:extLst>
           </p:nvPr>
@@ -18384,6 +18927,35 @@
           </a:graphicData>
         </a:graphic>
       </p:graphicFrame>
+      <p:sp>
+        <p:nvSpPr>
+          <p:cNvPr id="3" name="Espace réservé du numéro de diapositive 2">
+            <a:extLst>
+              <a:ext uri="{FF2B5EF4-FFF2-40B4-BE49-F238E27FC236}">
+                <a16:creationId xmlns:a16="http://schemas.microsoft.com/office/drawing/2014/main" id="{BF694719-3C6B-DE4E-AE09-96B307D99164}"/>
+              </a:ext>
+            </a:extLst>
+          </p:cNvPr>
+          <p:cNvSpPr>
+            <a:spLocks noGrp="1"/>
+          </p:cNvSpPr>
+          <p:nvPr>
+            <p:ph type="sldNum" sz="quarter" idx="12"/>
+          </p:nvPr>
+        </p:nvSpPr>
+        <p:spPr/>
+        <p:txBody>
+          <a:bodyPr/>
+          <a:lstStyle/>
+          <a:p>
+            <a:fld id="{2998BCD1-668E-5F49-8470-CD83C6A10F3B}" type="slidenum">
+              <a:rPr lang="fr-FR" smtClean="0"/>
+              <a:t>8</a:t>
+            </a:fld>
+            <a:endParaRPr lang="fr-FR"/>
+          </a:p>
+        </p:txBody>
+      </p:sp>
     </p:spTree>
     <p:extLst>
       <p:ext uri="{BB962C8B-B14F-4D97-AF65-F5344CB8AC3E}">
@@ -20234,6 +20806,35 @@
           </a:graphicData>
         </a:graphic>
       </p:graphicFrame>
+      <p:sp>
+        <p:nvSpPr>
+          <p:cNvPr id="3" name="Espace réservé du numéro de diapositive 2">
+            <a:extLst>
+              <a:ext uri="{FF2B5EF4-FFF2-40B4-BE49-F238E27FC236}">
+                <a16:creationId xmlns:a16="http://schemas.microsoft.com/office/drawing/2014/main" id="{D7356541-C428-FC45-A7BE-4A6976837D8F}"/>
+              </a:ext>
+            </a:extLst>
+          </p:cNvPr>
+          <p:cNvSpPr>
+            <a:spLocks noGrp="1"/>
+          </p:cNvSpPr>
+          <p:nvPr>
+            <p:ph type="sldNum" sz="quarter" idx="12"/>
+          </p:nvPr>
+        </p:nvSpPr>
+        <p:spPr/>
+        <p:txBody>
+          <a:bodyPr/>
+          <a:lstStyle/>
+          <a:p>
+            <a:fld id="{2998BCD1-668E-5F49-8470-CD83C6A10F3B}" type="slidenum">
+              <a:rPr lang="fr-FR" smtClean="0"/>
+              <a:t>9</a:t>
+            </a:fld>
+            <a:endParaRPr lang="fr-FR"/>
+          </a:p>
+        </p:txBody>
+      </p:sp>
     </p:spTree>
     <p:extLst>
       <p:ext uri="{BB962C8B-B14F-4D97-AF65-F5344CB8AC3E}">

</xml_diff>